<commit_message>
Bug collapsed Box klappt bei erstem mal zu schnell auf behoben, Stack nach BO bild angepasst
</commit_message>
<xml_diff>
--- a/Projekte/SecWorkbench/Content/img/Attacks/BufferOverflowImg/Raw/Buffer_Overflow_Theorie.pptx
+++ b/Projekte/SecWorkbench/Content/img/Attacks/BufferOverflowImg/Raw/Buffer_Overflow_Theorie.pptx
@@ -248,7 +248,7 @@
           <a:p>
             <a:fld id="{292D5A05-F0E8-434F-A194-74FC51DB2F32}" type="datetimeFigureOut">
               <a:rPr lang="de-DE" smtClean="0"/>
-              <a:t>08.11.2017</a:t>
+              <a:t>06.12.2017</a:t>
             </a:fld>
             <a:endParaRPr lang="de-DE"/>
           </a:p>
@@ -418,7 +418,7 @@
           <a:p>
             <a:fld id="{292D5A05-F0E8-434F-A194-74FC51DB2F32}" type="datetimeFigureOut">
               <a:rPr lang="de-DE" smtClean="0"/>
-              <a:t>08.11.2017</a:t>
+              <a:t>06.12.2017</a:t>
             </a:fld>
             <a:endParaRPr lang="de-DE"/>
           </a:p>
@@ -598,7 +598,7 @@
           <a:p>
             <a:fld id="{292D5A05-F0E8-434F-A194-74FC51DB2F32}" type="datetimeFigureOut">
               <a:rPr lang="de-DE" smtClean="0"/>
-              <a:t>08.11.2017</a:t>
+              <a:t>06.12.2017</a:t>
             </a:fld>
             <a:endParaRPr lang="de-DE"/>
           </a:p>
@@ -768,7 +768,7 @@
           <a:p>
             <a:fld id="{292D5A05-F0E8-434F-A194-74FC51DB2F32}" type="datetimeFigureOut">
               <a:rPr lang="de-DE" smtClean="0"/>
-              <a:t>08.11.2017</a:t>
+              <a:t>06.12.2017</a:t>
             </a:fld>
             <a:endParaRPr lang="de-DE"/>
           </a:p>
@@ -1012,7 +1012,7 @@
           <a:p>
             <a:fld id="{292D5A05-F0E8-434F-A194-74FC51DB2F32}" type="datetimeFigureOut">
               <a:rPr lang="de-DE" smtClean="0"/>
-              <a:t>08.11.2017</a:t>
+              <a:t>06.12.2017</a:t>
             </a:fld>
             <a:endParaRPr lang="de-DE"/>
           </a:p>
@@ -1244,7 +1244,7 @@
           <a:p>
             <a:fld id="{292D5A05-F0E8-434F-A194-74FC51DB2F32}" type="datetimeFigureOut">
               <a:rPr lang="de-DE" smtClean="0"/>
-              <a:t>08.11.2017</a:t>
+              <a:t>06.12.2017</a:t>
             </a:fld>
             <a:endParaRPr lang="de-DE"/>
           </a:p>
@@ -1611,7 +1611,7 @@
           <a:p>
             <a:fld id="{292D5A05-F0E8-434F-A194-74FC51DB2F32}" type="datetimeFigureOut">
               <a:rPr lang="de-DE" smtClean="0"/>
-              <a:t>08.11.2017</a:t>
+              <a:t>06.12.2017</a:t>
             </a:fld>
             <a:endParaRPr lang="de-DE"/>
           </a:p>
@@ -1729,7 +1729,7 @@
           <a:p>
             <a:fld id="{292D5A05-F0E8-434F-A194-74FC51DB2F32}" type="datetimeFigureOut">
               <a:rPr lang="de-DE" smtClean="0"/>
-              <a:t>08.11.2017</a:t>
+              <a:t>06.12.2017</a:t>
             </a:fld>
             <a:endParaRPr lang="de-DE"/>
           </a:p>
@@ -1824,7 +1824,7 @@
           <a:p>
             <a:fld id="{292D5A05-F0E8-434F-A194-74FC51DB2F32}" type="datetimeFigureOut">
               <a:rPr lang="de-DE" smtClean="0"/>
-              <a:t>08.11.2017</a:t>
+              <a:t>06.12.2017</a:t>
             </a:fld>
             <a:endParaRPr lang="de-DE"/>
           </a:p>
@@ -2101,7 +2101,7 @@
           <a:p>
             <a:fld id="{292D5A05-F0E8-434F-A194-74FC51DB2F32}" type="datetimeFigureOut">
               <a:rPr lang="de-DE" smtClean="0"/>
-              <a:t>08.11.2017</a:t>
+              <a:t>06.12.2017</a:t>
             </a:fld>
             <a:endParaRPr lang="de-DE"/>
           </a:p>
@@ -2358,7 +2358,7 @@
           <a:p>
             <a:fld id="{292D5A05-F0E8-434F-A194-74FC51DB2F32}" type="datetimeFigureOut">
               <a:rPr lang="de-DE" smtClean="0"/>
-              <a:t>08.11.2017</a:t>
+              <a:t>06.12.2017</a:t>
             </a:fld>
             <a:endParaRPr lang="de-DE"/>
           </a:p>
@@ -2571,7 +2571,7 @@
           <a:p>
             <a:fld id="{292D5A05-F0E8-434F-A194-74FC51DB2F32}" type="datetimeFigureOut">
               <a:rPr lang="de-DE" smtClean="0"/>
-              <a:t>08.11.2017</a:t>
+              <a:t>06.12.2017</a:t>
             </a:fld>
             <a:endParaRPr lang="de-DE"/>
           </a:p>
@@ -4669,7 +4669,7 @@
                 </a:br>
                 <a:r>
                   <a:rPr lang="de-DE" sz="1000" dirty="0"/>
-                  <a:t>(z.B. Konstanten)</a:t>
+                  <a:t>(z.B. Zeichenketten)</a:t>
                 </a:r>
               </a:p>
             </p:txBody>

</xml_diff>